<commit_message>
update logo, fix broken links
</commit_message>
<xml_diff>
--- a/assets/logo.pptx
+++ b/assets/logo.pptx
@@ -261,7 +261,7 @@
           <a:p>
             <a:fld id="{D2251D8B-D969-7F4E-8CF2-11B6AA2BAFEC}" type="datetimeFigureOut">
               <a:rPr lang="en-US" smtClean="0"/>
-              <a:t>10/13/23</a:t>
+              <a:t>8/8/24</a:t>
             </a:fld>
             <a:endParaRPr lang="en-US"/>
           </a:p>
@@ -461,7 +461,7 @@
           <a:p>
             <a:fld id="{D2251D8B-D969-7F4E-8CF2-11B6AA2BAFEC}" type="datetimeFigureOut">
               <a:rPr lang="en-US" smtClean="0"/>
-              <a:t>10/13/23</a:t>
+              <a:t>8/8/24</a:t>
             </a:fld>
             <a:endParaRPr lang="en-US"/>
           </a:p>
@@ -671,7 +671,7 @@
           <a:p>
             <a:fld id="{D2251D8B-D969-7F4E-8CF2-11B6AA2BAFEC}" type="datetimeFigureOut">
               <a:rPr lang="en-US" smtClean="0"/>
-              <a:t>10/13/23</a:t>
+              <a:t>8/8/24</a:t>
             </a:fld>
             <a:endParaRPr lang="en-US"/>
           </a:p>
@@ -871,7 +871,7 @@
           <a:p>
             <a:fld id="{D2251D8B-D969-7F4E-8CF2-11B6AA2BAFEC}" type="datetimeFigureOut">
               <a:rPr lang="en-US" smtClean="0"/>
-              <a:t>10/13/23</a:t>
+              <a:t>8/8/24</a:t>
             </a:fld>
             <a:endParaRPr lang="en-US"/>
           </a:p>
@@ -1147,7 +1147,7 @@
           <a:p>
             <a:fld id="{D2251D8B-D969-7F4E-8CF2-11B6AA2BAFEC}" type="datetimeFigureOut">
               <a:rPr lang="en-US" smtClean="0"/>
-              <a:t>10/13/23</a:t>
+              <a:t>8/8/24</a:t>
             </a:fld>
             <a:endParaRPr lang="en-US"/>
           </a:p>
@@ -1415,7 +1415,7 @@
           <a:p>
             <a:fld id="{D2251D8B-D969-7F4E-8CF2-11B6AA2BAFEC}" type="datetimeFigureOut">
               <a:rPr lang="en-US" smtClean="0"/>
-              <a:t>10/13/23</a:t>
+              <a:t>8/8/24</a:t>
             </a:fld>
             <a:endParaRPr lang="en-US"/>
           </a:p>
@@ -1830,7 +1830,7 @@
           <a:p>
             <a:fld id="{D2251D8B-D969-7F4E-8CF2-11B6AA2BAFEC}" type="datetimeFigureOut">
               <a:rPr lang="en-US" smtClean="0"/>
-              <a:t>10/13/23</a:t>
+              <a:t>8/8/24</a:t>
             </a:fld>
             <a:endParaRPr lang="en-US"/>
           </a:p>
@@ -1972,7 +1972,7 @@
           <a:p>
             <a:fld id="{D2251D8B-D969-7F4E-8CF2-11B6AA2BAFEC}" type="datetimeFigureOut">
               <a:rPr lang="en-US" smtClean="0"/>
-              <a:t>10/13/23</a:t>
+              <a:t>8/8/24</a:t>
             </a:fld>
             <a:endParaRPr lang="en-US"/>
           </a:p>
@@ -2085,7 +2085,7 @@
           <a:p>
             <a:fld id="{D2251D8B-D969-7F4E-8CF2-11B6AA2BAFEC}" type="datetimeFigureOut">
               <a:rPr lang="en-US" smtClean="0"/>
-              <a:t>10/13/23</a:t>
+              <a:t>8/8/24</a:t>
             </a:fld>
             <a:endParaRPr lang="en-US"/>
           </a:p>
@@ -2398,7 +2398,7 @@
           <a:p>
             <a:fld id="{D2251D8B-D969-7F4E-8CF2-11B6AA2BAFEC}" type="datetimeFigureOut">
               <a:rPr lang="en-US" smtClean="0"/>
-              <a:t>10/13/23</a:t>
+              <a:t>8/8/24</a:t>
             </a:fld>
             <a:endParaRPr lang="en-US"/>
           </a:p>
@@ -2687,7 +2687,7 @@
           <a:p>
             <a:fld id="{D2251D8B-D969-7F4E-8CF2-11B6AA2BAFEC}" type="datetimeFigureOut">
               <a:rPr lang="en-US" smtClean="0"/>
-              <a:t>10/13/23</a:t>
+              <a:t>8/8/24</a:t>
             </a:fld>
             <a:endParaRPr lang="en-US"/>
           </a:p>
@@ -2930,7 +2930,7 @@
           <a:p>
             <a:fld id="{D2251D8B-D969-7F4E-8CF2-11B6AA2BAFEC}" type="datetimeFigureOut">
               <a:rPr lang="en-US" smtClean="0"/>
-              <a:t>10/13/23</a:t>
+              <a:t>8/8/24</a:t>
             </a:fld>
             <a:endParaRPr lang="en-US"/>
           </a:p>
@@ -3399,17 +3399,17 @@
               <a:r>
                 <a:rPr lang="en-US" sz="8000" dirty="0">
                   <a:solidFill>
-                    <a:srgbClr val="1ABC9C"/>
+                    <a:srgbClr val="6D8E79"/>
                   </a:solidFill>
                   <a:latin typeface="Source Sans Pro" panose="020B0503030403020204" pitchFamily="34" charset="0"/>
                   <a:ea typeface="Source Sans Pro" panose="020B0503030403020204" pitchFamily="34" charset="0"/>
                   <a:cs typeface="Open Sans Light" pitchFamily="2" charset="0"/>
                 </a:rPr>
-                <a:t>0030</a:t>
+                <a:t>TIED</a:t>
               </a:r>
               <a:endParaRPr lang="en-US" sz="6000" dirty="0">
                 <a:solidFill>
-                  <a:srgbClr val="1ABC9C"/>
+                  <a:srgbClr val="6D8E79"/>
                 </a:solidFill>
                 <a:latin typeface="Source Sans Pro" panose="020B0503030403020204" pitchFamily="34" charset="0"/>
                 <a:ea typeface="Source Sans Pro" panose="020B0503030403020204" pitchFamily="34" charset="0"/>
@@ -3458,7 +3458,7 @@
                   <a:ea typeface="Source Sans Pro" panose="020F0502020204030204" pitchFamily="34" charset="0"/>
                   <a:cs typeface="Open Sans Light" pitchFamily="2" charset="0"/>
                 </a:rPr>
-                <a:t>GEOG</a:t>
+                <a:t>SA</a:t>
               </a:r>
               <a:endParaRPr lang="en-US" sz="6000" dirty="0">
                 <a:solidFill>

</xml_diff>